<commit_message>
Put together figure 1 draft
</commit_message>
<xml_diff>
--- a/figures/model_details.pptx
+++ b/figures/model_details.pptx
@@ -255,7 +255,7 @@
           <a:p>
             <a:fld id="{3EE3128F-A3D7-5E4C-9B20-36EBE850F38E}" type="datetimeFigureOut">
               <a:rPr lang="en-GB" smtClean="0"/>
-              <a:t>12/11/2021</a:t>
+              <a:t>15/11/2021</a:t>
             </a:fld>
             <a:endParaRPr lang="en-GB"/>
           </a:p>
@@ -425,7 +425,7 @@
           <a:p>
             <a:fld id="{3EE3128F-A3D7-5E4C-9B20-36EBE850F38E}" type="datetimeFigureOut">
               <a:rPr lang="en-GB" smtClean="0"/>
-              <a:t>12/11/2021</a:t>
+              <a:t>15/11/2021</a:t>
             </a:fld>
             <a:endParaRPr lang="en-GB"/>
           </a:p>
@@ -605,7 +605,7 @@
           <a:p>
             <a:fld id="{3EE3128F-A3D7-5E4C-9B20-36EBE850F38E}" type="datetimeFigureOut">
               <a:rPr lang="en-GB" smtClean="0"/>
-              <a:t>12/11/2021</a:t>
+              <a:t>15/11/2021</a:t>
             </a:fld>
             <a:endParaRPr lang="en-GB"/>
           </a:p>
@@ -775,7 +775,7 @@
           <a:p>
             <a:fld id="{3EE3128F-A3D7-5E4C-9B20-36EBE850F38E}" type="datetimeFigureOut">
               <a:rPr lang="en-GB" smtClean="0"/>
-              <a:t>12/11/2021</a:t>
+              <a:t>15/11/2021</a:t>
             </a:fld>
             <a:endParaRPr lang="en-GB"/>
           </a:p>
@@ -1021,7 +1021,7 @@
           <a:p>
             <a:fld id="{3EE3128F-A3D7-5E4C-9B20-36EBE850F38E}" type="datetimeFigureOut">
               <a:rPr lang="en-GB" smtClean="0"/>
-              <a:t>12/11/2021</a:t>
+              <a:t>15/11/2021</a:t>
             </a:fld>
             <a:endParaRPr lang="en-GB"/>
           </a:p>
@@ -1253,7 +1253,7 @@
           <a:p>
             <a:fld id="{3EE3128F-A3D7-5E4C-9B20-36EBE850F38E}" type="datetimeFigureOut">
               <a:rPr lang="en-GB" smtClean="0"/>
-              <a:t>12/11/2021</a:t>
+              <a:t>15/11/2021</a:t>
             </a:fld>
             <a:endParaRPr lang="en-GB"/>
           </a:p>
@@ -1620,7 +1620,7 @@
           <a:p>
             <a:fld id="{3EE3128F-A3D7-5E4C-9B20-36EBE850F38E}" type="datetimeFigureOut">
               <a:rPr lang="en-GB" smtClean="0"/>
-              <a:t>12/11/2021</a:t>
+              <a:t>15/11/2021</a:t>
             </a:fld>
             <a:endParaRPr lang="en-GB"/>
           </a:p>
@@ -1738,7 +1738,7 @@
           <a:p>
             <a:fld id="{3EE3128F-A3D7-5E4C-9B20-36EBE850F38E}" type="datetimeFigureOut">
               <a:rPr lang="en-GB" smtClean="0"/>
-              <a:t>12/11/2021</a:t>
+              <a:t>15/11/2021</a:t>
             </a:fld>
             <a:endParaRPr lang="en-GB"/>
           </a:p>
@@ -1833,7 +1833,7 @@
           <a:p>
             <a:fld id="{3EE3128F-A3D7-5E4C-9B20-36EBE850F38E}" type="datetimeFigureOut">
               <a:rPr lang="en-GB" smtClean="0"/>
-              <a:t>12/11/2021</a:t>
+              <a:t>15/11/2021</a:t>
             </a:fld>
             <a:endParaRPr lang="en-GB"/>
           </a:p>
@@ -2110,7 +2110,7 @@
           <a:p>
             <a:fld id="{3EE3128F-A3D7-5E4C-9B20-36EBE850F38E}" type="datetimeFigureOut">
               <a:rPr lang="en-GB" smtClean="0"/>
-              <a:t>12/11/2021</a:t>
+              <a:t>15/11/2021</a:t>
             </a:fld>
             <a:endParaRPr lang="en-GB"/>
           </a:p>
@@ -2367,7 +2367,7 @@
           <a:p>
             <a:fld id="{3EE3128F-A3D7-5E4C-9B20-36EBE850F38E}" type="datetimeFigureOut">
               <a:rPr lang="en-GB" smtClean="0"/>
-              <a:t>12/11/2021</a:t>
+              <a:t>15/11/2021</a:t>
             </a:fld>
             <a:endParaRPr lang="en-GB"/>
           </a:p>
@@ -2580,7 +2580,7 @@
           <a:p>
             <a:fld id="{3EE3128F-A3D7-5E4C-9B20-36EBE850F38E}" type="datetimeFigureOut">
               <a:rPr lang="en-GB" smtClean="0"/>
-              <a:t>12/11/2021</a:t>
+              <a:t>15/11/2021</a:t>
             </a:fld>
             <a:endParaRPr lang="en-GB"/>
           </a:p>
@@ -3040,8 +3040,8 @@
           </a:p>
         </p:txBody>
       </p:sp>
-      <mc:AlternateContent xmlns:mc="http://schemas.openxmlformats.org/markup-compatibility/2006">
-        <mc:Choice xmlns:a14="http://schemas.microsoft.com/office/drawing/2010/main" Requires="a14">
+      <mc:AlternateContent xmlns:mc="http://schemas.openxmlformats.org/markup-compatibility/2006" xmlns:a14="http://schemas.microsoft.com/office/drawing/2010/main">
+        <mc:Choice Requires="a14">
           <p:sp>
             <p:nvSpPr>
               <p:cNvPr id="62" name="TextBox 61">
@@ -3203,7 +3203,7 @@
             </p:txBody>
           </p:sp>
         </mc:Choice>
-        <mc:Fallback>
+        <mc:Fallback xmlns="">
           <p:sp>
             <p:nvSpPr>
               <p:cNvPr id="62" name="TextBox 61">
@@ -4390,7 +4390,7 @@
         </p:nvSpPr>
         <p:spPr>
           <a:xfrm>
-            <a:off x="156981" y="152278"/>
+            <a:off x="156981" y="95128"/>
             <a:ext cx="832355" cy="100800"/>
           </a:xfrm>
           <a:prstGeom prst="rect">
@@ -4442,7 +4442,7 @@
         </p:nvSpPr>
         <p:spPr>
           <a:xfrm rot="5400000">
-            <a:off x="-173711" y="804015"/>
+            <a:off x="-173711" y="486515"/>
             <a:ext cx="439818" cy="81321"/>
           </a:xfrm>
           <a:prstGeom prst="rightArrow">
@@ -4494,7 +4494,7 @@
         </p:nvSpPr>
         <p:spPr>
           <a:xfrm rot="16200000">
-            <a:off x="1902301" y="812697"/>
+            <a:off x="1902301" y="495197"/>
             <a:ext cx="427355" cy="81323"/>
           </a:xfrm>
           <a:prstGeom prst="rightArrow">
@@ -4546,7 +4546,7 @@
         </p:nvSpPr>
         <p:spPr>
           <a:xfrm>
-            <a:off x="1030688" y="169459"/>
+            <a:off x="1030688" y="112309"/>
             <a:ext cx="100800" cy="71973"/>
           </a:xfrm>
           <a:prstGeom prst="rightArrow">
@@ -4601,7 +4601,7 @@
         </p:nvSpPr>
         <p:spPr>
           <a:xfrm>
-            <a:off x="577136" y="319307"/>
+            <a:off x="577136" y="262157"/>
             <a:ext cx="414000" cy="100800"/>
           </a:xfrm>
           <a:prstGeom prst="rect">
@@ -4653,7 +4653,7 @@
         </p:nvSpPr>
         <p:spPr>
           <a:xfrm>
-            <a:off x="784136" y="492017"/>
+            <a:off x="784136" y="434867"/>
             <a:ext cx="205200" cy="100800"/>
           </a:xfrm>
           <a:prstGeom prst="rect">
@@ -4705,7 +4705,7 @@
         </p:nvSpPr>
         <p:spPr>
           <a:xfrm>
-            <a:off x="888536" y="652381"/>
+            <a:off x="888536" y="595231"/>
             <a:ext cx="100800" cy="100800"/>
           </a:xfrm>
           <a:prstGeom prst="rect">
@@ -4757,7 +4757,7 @@
         </p:nvSpPr>
         <p:spPr>
           <a:xfrm>
-            <a:off x="938936" y="803800"/>
+            <a:off x="938936" y="746650"/>
             <a:ext cx="50400" cy="100800"/>
           </a:xfrm>
           <a:prstGeom prst="rect">
@@ -4809,7 +4809,7 @@
         </p:nvSpPr>
         <p:spPr>
           <a:xfrm>
-            <a:off x="1069863" y="917408"/>
+            <a:off x="1069863" y="860258"/>
             <a:ext cx="28800" cy="100800"/>
           </a:xfrm>
           <a:prstGeom prst="rect">
@@ -4861,7 +4861,7 @@
         </p:nvSpPr>
         <p:spPr>
           <a:xfrm>
-            <a:off x="5562" y="730247"/>
+            <a:off x="5562" y="412747"/>
             <a:ext cx="665642" cy="246221"/>
           </a:xfrm>
           <a:prstGeom prst="rect">
@@ -4896,7 +4896,7 @@
         </p:nvSpPr>
         <p:spPr>
           <a:xfrm>
-            <a:off x="1448090" y="730251"/>
+            <a:off x="1448090" y="412751"/>
             <a:ext cx="707245" cy="246221"/>
           </a:xfrm>
           <a:prstGeom prst="rect">
@@ -4932,7 +4932,7 @@
         </p:nvSpPr>
         <p:spPr>
           <a:xfrm rot="10800000" flipH="1">
-            <a:off x="1171252" y="157245"/>
+            <a:off x="1171252" y="100095"/>
             <a:ext cx="832355" cy="45719"/>
           </a:xfrm>
           <a:prstGeom prst="rect">
@@ -4987,7 +4987,7 @@
         </p:nvSpPr>
         <p:spPr>
           <a:xfrm rot="10800000" flipH="1">
-            <a:off x="1171791" y="317302"/>
+            <a:off x="1171791" y="260152"/>
             <a:ext cx="414000" cy="45719"/>
           </a:xfrm>
           <a:prstGeom prst="rect">
@@ -5042,7 +5042,7 @@
         </p:nvSpPr>
         <p:spPr>
           <a:xfrm rot="10800000" flipH="1">
-            <a:off x="1174497" y="496331"/>
+            <a:off x="1174497" y="439181"/>
             <a:ext cx="205200" cy="45719"/>
           </a:xfrm>
           <a:prstGeom prst="rect">
@@ -5097,7 +5097,7 @@
         </p:nvSpPr>
         <p:spPr>
           <a:xfrm rot="10800000" flipH="1">
-            <a:off x="1177198" y="652381"/>
+            <a:off x="1177198" y="595231"/>
             <a:ext cx="100800" cy="45719"/>
           </a:xfrm>
           <a:prstGeom prst="rect">
@@ -5152,7 +5152,7 @@
         </p:nvSpPr>
         <p:spPr>
           <a:xfrm rot="10800000" flipH="1">
-            <a:off x="1172699" y="800759"/>
+            <a:off x="1172699" y="743609"/>
             <a:ext cx="50400" cy="45719"/>
           </a:xfrm>
           <a:prstGeom prst="rect">
@@ -5207,7 +5207,7 @@
         </p:nvSpPr>
         <p:spPr>
           <a:xfrm rot="10800000" flipH="1">
-            <a:off x="1171252" y="199579"/>
+            <a:off x="1171252" y="142429"/>
             <a:ext cx="832355" cy="45719"/>
           </a:xfrm>
           <a:prstGeom prst="rect">
@@ -5259,7 +5259,7 @@
         </p:nvSpPr>
         <p:spPr>
           <a:xfrm rot="10800000" flipH="1">
-            <a:off x="1171791" y="359636"/>
+            <a:off x="1171791" y="302486"/>
             <a:ext cx="414000" cy="45719"/>
           </a:xfrm>
           <a:prstGeom prst="rect">
@@ -5311,7 +5311,7 @@
         </p:nvSpPr>
         <p:spPr>
           <a:xfrm rot="10800000" flipH="1">
-            <a:off x="1174497" y="538665"/>
+            <a:off x="1174497" y="481515"/>
             <a:ext cx="205200" cy="45719"/>
           </a:xfrm>
           <a:prstGeom prst="rect">
@@ -5363,7 +5363,7 @@
         </p:nvSpPr>
         <p:spPr>
           <a:xfrm rot="10800000" flipH="1">
-            <a:off x="1177198" y="694715"/>
+            <a:off x="1177198" y="637565"/>
             <a:ext cx="100800" cy="45719"/>
           </a:xfrm>
           <a:prstGeom prst="rect">
@@ -5415,7 +5415,7 @@
         </p:nvSpPr>
         <p:spPr>
           <a:xfrm rot="10800000" flipH="1">
-            <a:off x="1172699" y="843093"/>
+            <a:off x="1172699" y="785943"/>
             <a:ext cx="50400" cy="45719"/>
           </a:xfrm>
           <a:prstGeom prst="rect">
@@ -5467,7 +5467,7 @@
         </p:nvSpPr>
         <p:spPr>
           <a:xfrm>
-            <a:off x="1077579" y="918258"/>
+            <a:off x="1077579" y="861108"/>
             <a:ext cx="14400" cy="100800"/>
           </a:xfrm>
           <a:prstGeom prst="rect">
@@ -5516,7 +5516,7 @@
         </p:nvSpPr>
         <p:spPr>
           <a:xfrm>
-            <a:off x="1169613" y="76879"/>
+            <a:off x="1169613" y="19729"/>
             <a:ext cx="832355" cy="45720"/>
           </a:xfrm>
           <a:prstGeom prst="rect">
@@ -5568,12 +5568,15 @@
         </p:nvSpPr>
         <p:spPr>
           <a:xfrm>
-            <a:off x="1277997" y="74895"/>
+            <a:off x="1277997" y="17745"/>
             <a:ext cx="18000" cy="46800"/>
           </a:xfrm>
           <a:prstGeom prst="rect">
             <a:avLst/>
           </a:prstGeom>
+          <a:solidFill>
+            <a:srgbClr val="618559"/>
+          </a:solidFill>
           <a:ln>
             <a:noFill/>
           </a:ln>
@@ -5617,7 +5620,7 @@
         </p:nvSpPr>
         <p:spPr>
           <a:xfrm>
-            <a:off x="954611" y="803800"/>
+            <a:off x="954611" y="746650"/>
             <a:ext cx="21600" cy="100800"/>
           </a:xfrm>
           <a:prstGeom prst="rect">
@@ -5666,7 +5669,7 @@
         </p:nvSpPr>
         <p:spPr>
           <a:xfrm>
-            <a:off x="920109" y="651126"/>
+            <a:off x="920109" y="593976"/>
             <a:ext cx="43200" cy="100800"/>
           </a:xfrm>
           <a:prstGeom prst="rect">
@@ -5715,7 +5718,7 @@
         </p:nvSpPr>
         <p:spPr>
           <a:xfrm>
-            <a:off x="837592" y="492017"/>
+            <a:off x="837592" y="434867"/>
             <a:ext cx="108000" cy="100800"/>
           </a:xfrm>
           <a:prstGeom prst="rect">
@@ -5764,7 +5767,7 @@
         </p:nvSpPr>
         <p:spPr>
           <a:xfrm>
-            <a:off x="684451" y="319307"/>
+            <a:off x="684451" y="262157"/>
             <a:ext cx="216000" cy="100800"/>
           </a:xfrm>
           <a:prstGeom prst="rect">
@@ -5813,7 +5816,7 @@
         </p:nvSpPr>
         <p:spPr>
           <a:xfrm>
-            <a:off x="332130" y="154069"/>
+            <a:off x="332130" y="96919"/>
             <a:ext cx="432000" cy="100800"/>
           </a:xfrm>
           <a:prstGeom prst="rect">
@@ -5862,7 +5865,7 @@
         </p:nvSpPr>
         <p:spPr>
           <a:xfrm>
-            <a:off x="1274034" y="159746"/>
+            <a:off x="1274034" y="102596"/>
             <a:ext cx="21600" cy="86400"/>
           </a:xfrm>
           <a:prstGeom prst="rect">
@@ -5911,7 +5914,7 @@
         </p:nvSpPr>
         <p:spPr>
           <a:xfrm>
-            <a:off x="1264509" y="318806"/>
+            <a:off x="1264509" y="261656"/>
             <a:ext cx="25200" cy="86400"/>
           </a:xfrm>
           <a:prstGeom prst="rect">
@@ -5960,7 +5963,7 @@
         </p:nvSpPr>
         <p:spPr>
           <a:xfrm>
-            <a:off x="1232733" y="496137"/>
+            <a:off x="1232733" y="438987"/>
             <a:ext cx="28800" cy="86400"/>
           </a:xfrm>
           <a:prstGeom prst="rect">
@@ -6009,7 +6012,7 @@
         </p:nvSpPr>
         <p:spPr>
           <a:xfrm>
-            <a:off x="1196622" y="651937"/>
+            <a:off x="1196622" y="594787"/>
             <a:ext cx="28800" cy="86400"/>
           </a:xfrm>
           <a:prstGeom prst="rect">
@@ -6058,7 +6061,7 @@
         </p:nvSpPr>
         <p:spPr>
           <a:xfrm>
-            <a:off x="1176804" y="799893"/>
+            <a:off x="1176804" y="742743"/>
             <a:ext cx="32400" cy="86400"/>
           </a:xfrm>
           <a:prstGeom prst="rect">
@@ -6107,7 +6110,7 @@
         </p:nvSpPr>
         <p:spPr>
           <a:xfrm>
-            <a:off x="1033454" y="323648"/>
+            <a:off x="1033454" y="266498"/>
             <a:ext cx="100800" cy="71973"/>
           </a:xfrm>
           <a:prstGeom prst="rightArrow">
@@ -6162,7 +6165,7 @@
         </p:nvSpPr>
         <p:spPr>
           <a:xfrm>
-            <a:off x="1033863" y="503763"/>
+            <a:off x="1033863" y="446613"/>
             <a:ext cx="100800" cy="71973"/>
           </a:xfrm>
           <a:prstGeom prst="rightArrow">
@@ -6217,7 +6220,7 @@
         </p:nvSpPr>
         <p:spPr>
           <a:xfrm>
-            <a:off x="1037781" y="667356"/>
+            <a:off x="1037781" y="610206"/>
             <a:ext cx="100800" cy="71973"/>
           </a:xfrm>
           <a:prstGeom prst="rightArrow">
@@ -6272,7 +6275,7 @@
         </p:nvSpPr>
         <p:spPr>
           <a:xfrm>
-            <a:off x="1034135" y="811377"/>
+            <a:off x="1034135" y="754227"/>
             <a:ext cx="100800" cy="71973"/>
           </a:xfrm>
           <a:prstGeom prst="rightArrow">
@@ -6310,6 +6313,45 @@
           <a:p>
             <a:pPr algn="ctr"/>
             <a:endParaRPr lang="en-GB" dirty="0"/>
+          </a:p>
+        </p:txBody>
+      </p:sp>
+      <p:sp>
+        <p:nvSpPr>
+          <p:cNvPr id="42" name="TextBox 41">
+            <a:extLst>
+              <a:ext uri="{FF2B5EF4-FFF2-40B4-BE49-F238E27FC236}">
+                <a16:creationId xmlns:a16="http://schemas.microsoft.com/office/drawing/2014/main" id="{D23C319D-1764-8D40-856D-987EFD4945CF}"/>
+              </a:ext>
+            </a:extLst>
+          </p:cNvPr>
+          <p:cNvSpPr txBox="1"/>
+          <p:nvPr/>
+        </p:nvSpPr>
+        <p:spPr>
+          <a:xfrm>
+            <a:off x="-67608" y="891533"/>
+            <a:ext cx="1047082" cy="246221"/>
+          </a:xfrm>
+          <a:prstGeom prst="rect">
+            <a:avLst/>
+          </a:prstGeom>
+          <a:noFill/>
+        </p:spPr>
+        <p:txBody>
+          <a:bodyPr wrap="square" rtlCol="0">
+            <a:spAutoFit/>
+          </a:bodyPr>
+          <a:lstStyle/>
+          <a:p>
+            <a:r>
+              <a:rPr lang="en-GB" sz="1000" dirty="0">
+                <a:solidFill>
+                  <a:srgbClr val="4473C4"/>
+                </a:solidFill>
+              </a:rPr>
+              <a:t>Receptive Field</a:t>
+            </a:r>
           </a:p>
         </p:txBody>
       </p:sp>

</xml_diff>